<commit_message>
Updated with both drivers
</commit_message>
<xml_diff>
--- a/contrib/secrets-store/images/VaultInitContainer.pptx
+++ b/contrib/secrets-store/images/VaultInitContainer.pptx
@@ -262,7 +262,7 @@
           <a:p>
             <a:fld id="{FBABBD2A-5989-9142-A1CD-F3A7CB7297A2}" type="datetimeFigureOut">
               <a:rPr lang="en-FR" smtClean="0"/>
-              <a:t>19/03/2024</a:t>
+              <a:t>02/05/2024</a:t>
             </a:fld>
             <a:endParaRPr lang="en-FR"/>
           </a:p>
@@ -462,7 +462,7 @@
           <a:p>
             <a:fld id="{FBABBD2A-5989-9142-A1CD-F3A7CB7297A2}" type="datetimeFigureOut">
               <a:rPr lang="en-FR" smtClean="0"/>
-              <a:t>19/03/2024</a:t>
+              <a:t>02/05/2024</a:t>
             </a:fld>
             <a:endParaRPr lang="en-FR"/>
           </a:p>
@@ -672,7 +672,7 @@
           <a:p>
             <a:fld id="{FBABBD2A-5989-9142-A1CD-F3A7CB7297A2}" type="datetimeFigureOut">
               <a:rPr lang="en-FR" smtClean="0"/>
-              <a:t>19/03/2024</a:t>
+              <a:t>02/05/2024</a:t>
             </a:fld>
             <a:endParaRPr lang="en-FR"/>
           </a:p>
@@ -872,7 +872,7 @@
           <a:p>
             <a:fld id="{FBABBD2A-5989-9142-A1CD-F3A7CB7297A2}" type="datetimeFigureOut">
               <a:rPr lang="en-FR" smtClean="0"/>
-              <a:t>19/03/2024</a:t>
+              <a:t>02/05/2024</a:t>
             </a:fld>
             <a:endParaRPr lang="en-FR"/>
           </a:p>
@@ -1148,7 +1148,7 @@
           <a:p>
             <a:fld id="{FBABBD2A-5989-9142-A1CD-F3A7CB7297A2}" type="datetimeFigureOut">
               <a:rPr lang="en-FR" smtClean="0"/>
-              <a:t>19/03/2024</a:t>
+              <a:t>02/05/2024</a:t>
             </a:fld>
             <a:endParaRPr lang="en-FR"/>
           </a:p>
@@ -1416,7 +1416,7 @@
           <a:p>
             <a:fld id="{FBABBD2A-5989-9142-A1CD-F3A7CB7297A2}" type="datetimeFigureOut">
               <a:rPr lang="en-FR" smtClean="0"/>
-              <a:t>19/03/2024</a:t>
+              <a:t>02/05/2024</a:t>
             </a:fld>
             <a:endParaRPr lang="en-FR"/>
           </a:p>
@@ -1831,7 +1831,7 @@
           <a:p>
             <a:fld id="{FBABBD2A-5989-9142-A1CD-F3A7CB7297A2}" type="datetimeFigureOut">
               <a:rPr lang="en-FR" smtClean="0"/>
-              <a:t>19/03/2024</a:t>
+              <a:t>02/05/2024</a:t>
             </a:fld>
             <a:endParaRPr lang="en-FR"/>
           </a:p>
@@ -1973,7 +1973,7 @@
           <a:p>
             <a:fld id="{FBABBD2A-5989-9142-A1CD-F3A7CB7297A2}" type="datetimeFigureOut">
               <a:rPr lang="en-FR" smtClean="0"/>
-              <a:t>19/03/2024</a:t>
+              <a:t>02/05/2024</a:t>
             </a:fld>
             <a:endParaRPr lang="en-FR"/>
           </a:p>
@@ -2086,7 +2086,7 @@
           <a:p>
             <a:fld id="{FBABBD2A-5989-9142-A1CD-F3A7CB7297A2}" type="datetimeFigureOut">
               <a:rPr lang="en-FR" smtClean="0"/>
-              <a:t>19/03/2024</a:t>
+              <a:t>02/05/2024</a:t>
             </a:fld>
             <a:endParaRPr lang="en-FR"/>
           </a:p>
@@ -2399,7 +2399,7 @@
           <a:p>
             <a:fld id="{FBABBD2A-5989-9142-A1CD-F3A7CB7297A2}" type="datetimeFigureOut">
               <a:rPr lang="en-FR" smtClean="0"/>
-              <a:t>19/03/2024</a:t>
+              <a:t>02/05/2024</a:t>
             </a:fld>
             <a:endParaRPr lang="en-FR"/>
           </a:p>
@@ -2688,7 +2688,7 @@
           <a:p>
             <a:fld id="{FBABBD2A-5989-9142-A1CD-F3A7CB7297A2}" type="datetimeFigureOut">
               <a:rPr lang="en-FR" smtClean="0"/>
-              <a:t>19/03/2024</a:t>
+              <a:t>02/05/2024</a:t>
             </a:fld>
             <a:endParaRPr lang="en-FR"/>
           </a:p>
@@ -2931,7 +2931,7 @@
           <a:p>
             <a:fld id="{FBABBD2A-5989-9142-A1CD-F3A7CB7297A2}" type="datetimeFigureOut">
               <a:rPr lang="en-FR" smtClean="0"/>
-              <a:t>19/03/2024</a:t>
+              <a:t>02/05/2024</a:t>
             </a:fld>
             <a:endParaRPr lang="en-FR"/>
           </a:p>
@@ -3574,7 +3574,7 @@
             <a:pPr algn="ctr"/>
             <a:r>
               <a:rPr lang="en-FR" dirty="0"/>
-              <a:t>Secret Store CSI </a:t>
+              <a:t>Secrets Store CSI </a:t>
             </a:r>
           </a:p>
           <a:p>
@@ -3582,6 +3582,13 @@
             <a:r>
               <a:rPr lang="en-FR" dirty="0"/>
               <a:t>Driver</a:t>
+            </a:r>
+            <a:br>
+              <a:rPr lang="en-FR" dirty="0"/>
+            </a:br>
+            <a:r>
+              <a:rPr lang="en-FR" dirty="0"/>
+              <a:t>+ Provider</a:t>
             </a:r>
           </a:p>
         </p:txBody>
@@ -3837,7 +3844,7 @@
           </p:blipFill>
           <p:spPr bwMode="auto">
             <a:xfrm>
-              <a:off x="547149" y="1970431"/>
+              <a:off x="547149" y="1958074"/>
               <a:ext cx="1658399" cy="555607"/>
             </a:xfrm>
             <a:prstGeom prst="rect">
@@ -3980,25 +3987,8 @@
           <a:p>
             <a:pPr algn="ctr"/>
             <a:r>
-              <a:rPr lang="en-FR" sz="1100" b="1" dirty="0">
-                <a:ln w="22225">
-                  <a:solidFill>
-                    <a:schemeClr val="accent2"/>
-                  </a:solidFill>
-                  <a:prstDash val="solid"/>
-                </a:ln>
-                <a:solidFill>
-                  <a:schemeClr val="accent2">
-                    <a:lumMod val="40000"/>
-                    <a:lumOff val="60000"/>
-                  </a:schemeClr>
-                </a:solidFill>
-              </a:rPr>
-              <a:t>S</a:t>
-            </a:r>
-            <a:r>
               <a:rPr lang="en-GB" sz="1100" dirty="0"/>
-              <a:t>secret</a:t>
+              <a:t>Secret</a:t>
             </a:r>
           </a:p>
           <a:p>

</xml_diff>